<commit_message>
Updated Tom Durfee poster material
</commit_message>
<xml_diff>
--- a/posters/2024_spring/thomas_durfee_240319.pptx
+++ b/posters/2024_spring/thomas_durfee_240319.pptx
@@ -254,7 +254,7 @@
       <p15:sldGuideLst xmlns:p15="http://schemas.microsoft.com/office/powerpoint/2012/main"/>
     </p:ext>
     <p:ext uri="http://customooxmlschemas.google.com/">
-      <go:slidesCustomData xmlns:go="http://customooxmlschemas.google.com/" xmlns:ahyp="http://schemas.microsoft.com/office/drawing/2018/hyperlinkcolor" xmlns:p15="http://schemas.microsoft.com/office/powerpoint/2012/main" xmlns:p14="http://schemas.microsoft.com/office/powerpoint/2010/main" xmlns:com="http://schemas.openxmlformats.org/drawingml/2006/compatibility" xmlns:pvml="urn:schemas-microsoft-com:office:powerpoint" xmlns:v="urn:schemas-microsoft-com:vml" xmlns:o="urn:schemas-microsoft-com:office:office" xmlns:dgm="http://schemas.openxmlformats.org/drawingml/2006/diagram" xmlns:c="http://schemas.openxmlformats.org/drawingml/2006/chart" xmlns:mv="urn:schemas-microsoft-com:mac:vml" xmlns:mc="http://schemas.openxmlformats.org/markup-compatibility/2006" xmlns="" r:id="rId12" roundtripDataSignature="AMtx7mj9Ic0Cos0+1WxzYeHFBp4wMVEnvg=="/>
+      <go:slidesCustomData xmlns="" xmlns:mc="http://schemas.openxmlformats.org/markup-compatibility/2006" xmlns:mv="urn:schemas-microsoft-com:mac:vml" xmlns:c="http://schemas.openxmlformats.org/drawingml/2006/chart" xmlns:dgm="http://schemas.openxmlformats.org/drawingml/2006/diagram" xmlns:o="urn:schemas-microsoft-com:office:office" xmlns:v="urn:schemas-microsoft-com:vml" xmlns:pvml="urn:schemas-microsoft-com:office:powerpoint" xmlns:com="http://schemas.openxmlformats.org/drawingml/2006/compatibility" xmlns:p14="http://schemas.microsoft.com/office/powerpoint/2010/main" xmlns:p15="http://schemas.microsoft.com/office/powerpoint/2012/main" xmlns:ahyp="http://schemas.microsoft.com/office/drawing/2018/hyperlinkcolor" xmlns:go="http://customooxmlschemas.google.com/" r:id="rId12" roundtripDataSignature="AMtx7mj9Ic0Cos0+1WxzYeHFBp4wMVEnvg=="/>
     </p:ext>
   </p:extLst>
 </p:presentation>
@@ -11244,7 +11244,7 @@
         <p:spPr>
           <a:xfrm>
             <a:off x="3398294" y="2226660"/>
-            <a:ext cx="4069306" cy="4031833"/>
+            <a:ext cx="4069306" cy="4585830"/>
           </a:xfrm>
           <a:prstGeom prst="rect">
             <a:avLst/>
@@ -11315,7 +11315,7 @@
               </a:spcAft>
               <a:buNone/>
             </a:pPr>
-            <a:endParaRPr lang="en-US" sz="3200" b="1" i="1" u="none" strike="noStrike" cap="none" dirty="0">
+            <a:endParaRPr lang="en-US" sz="1800" b="1" i="1" u="none" strike="noStrike" cap="none" dirty="0">
               <a:solidFill>
                 <a:schemeClr val="dk1"/>
               </a:solidFill>
@@ -11472,10 +11472,18 @@
             </a:pPr>
             <a:r>
               <a:rPr lang="en-US" sz="2400" dirty="0">
+                <a:solidFill>
+                  <a:schemeClr val="tx1">
+                    <a:lumMod val="95000"/>
+                    <a:lumOff val="5000"/>
+                  </a:schemeClr>
+                </a:solidFill>
                 <a:latin typeface="LM Roman 12" panose="00000500000000000000" pitchFamily="50" charset="0"/>
+                <a:cs typeface="Calibri"/>
+                <a:sym typeface="Calibri"/>
                 <a:hlinkClick r:id="rId3"/>
               </a:rPr>
-              <a:t>https://umn.zoom.us/j/97156270931</a:t>
+              <a:t>https://umn.zoom.us/j/93809319397?pwd=NVBMRDgrZVFYYUk0cHMxTXU4WjBFUT09</a:t>
             </a:r>
             <a:r>
               <a:rPr lang="en-US" sz="2400" dirty="0">
@@ -11576,22 +11584,25 @@
               <a:defRPr/>
             </a:pPr>
             <a:r>
-              <a:rPr kumimoji="0" lang="en-US" sz="2800" b="1" i="0" u="none" strike="noStrike" kern="1200" cap="none" spc="0" normalizeH="0" baseline="0" noProof="0" dirty="0">
-                <a:ln>
-                  <a:noFill/>
-                </a:ln>
-                <a:solidFill>
-                  <a:schemeClr val="tx1"/>
-                </a:solidFill>
-                <a:effectLst/>
-                <a:uLnTx/>
-                <a:uFillTx/>
+              <a:rPr lang="en-US" sz="2800" b="1" dirty="0">
                 <a:latin typeface="LM Roman 12" panose="00000500000000000000" pitchFamily="50" charset="0"/>
-                <a:ea typeface="Arial" panose="020B0604020202020204" pitchFamily="34" charset="0"/>
-                <a:cs typeface="+mn-cs"/>
               </a:rPr>
-              <a:t>The Basics of Unix Scripts and Batch Files</a:t>
+              <a:t>The UMN Supercomputer and Large Dataset Best Practices</a:t>
             </a:r>
+            <a:endParaRPr kumimoji="0" lang="en-US" sz="2000" b="1" i="0" u="none" strike="noStrike" kern="1200" cap="none" spc="0" normalizeH="0" baseline="0" noProof="0" dirty="0">
+              <a:ln>
+                <a:noFill/>
+              </a:ln>
+              <a:solidFill>
+                <a:schemeClr val="tx1"/>
+              </a:solidFill>
+              <a:effectLst/>
+              <a:uLnTx/>
+              <a:uFillTx/>
+              <a:latin typeface="LM Roman 12" panose="00000500000000000000" pitchFamily="50" charset="0"/>
+              <a:ea typeface="Arial" panose="020B0604020202020204" pitchFamily="34" charset="0"/>
+              <a:cs typeface="+mn-cs"/>
+            </a:endParaRPr>
           </a:p>
         </p:txBody>
       </p:sp>

</xml_diff>